<commit_message>
Added indexing strategy and policy content
</commit_message>
<xml_diff>
--- a/MCW-Cosmos-DB-Real-Time-Advanced-Analytics/Whiteboard design session/WDS trainer presentation - Cosmos DB Real Time Advanced Analytics.pptx
+++ b/MCW-Cosmos-DB-Real-Time-Advanced-Analytics/Whiteboard design session/WDS trainer presentation - Cosmos DB Real Time Advanced Analytics.pptx
@@ -6,7 +6,7 @@
     <p:sldMasterId id="2147483665" r:id="rId2"/>
   </p:sldMasterIdLst>
   <p:notesMasterIdLst>
-    <p:notesMasterId r:id="rId35"/>
+    <p:notesMasterId r:id="rId36"/>
   </p:notesMasterIdLst>
   <p:sldIdLst>
     <p:sldId id="300" r:id="rId3"/>
@@ -39,8 +39,9 @@
     <p:sldId id="336" r:id="rId30"/>
     <p:sldId id="337" r:id="rId31"/>
     <p:sldId id="339" r:id="rId32"/>
-    <p:sldId id="318" r:id="rId33"/>
-    <p:sldId id="315" r:id="rId34"/>
+    <p:sldId id="341" r:id="rId33"/>
+    <p:sldId id="318" r:id="rId34"/>
+    <p:sldId id="315" r:id="rId35"/>
   </p:sldIdLst>
   <p:sldSz cx="12192000" cy="6858000"/>
   <p:notesSz cx="6858000" cy="9144000"/>
@@ -150,8 +151,8 @@
 <file path=ppt/revisionInfo.xml><?xml version="1.0" encoding="utf-8"?>
 <p1510:revInfo xmlns:a="http://schemas.openxmlformats.org/drawingml/2006/main" xmlns:r="http://schemas.openxmlformats.org/officeDocument/2006/relationships" xmlns:p1510="http://schemas.microsoft.com/office/powerpoint/2015/10/main">
   <p1510:revLst>
+    <p1510:client id="{5F159153-6972-4091-9728-9592CD7B1E22}" v="1" dt="2018-06-29T19:57:36.034"/>
     <p1510:client id="{738DBAC3-60A1-4913-A600-E1113DEB827D}" v="37" dt="2018-05-10T17:30:28.024"/>
-    <p1510:client id="{5F159153-6972-4091-9728-9592CD7B1E22}" v="1" dt="2018-06-29T19:57:36.034"/>
   </p1510:revLst>
 </p1510:revInfo>
 </file>
@@ -238,7 +239,7 @@
           <a:p>
             <a:fld id="{52A13B17-C506-4D51-BB37-16B365906619}" type="datetimeFigureOut">
               <a:rPr lang="en-US" smtClean="0"/>
-              <a:t>5/21/2019</a:t>
+              <a:t>11/5/2019</a:t>
             </a:fld>
             <a:endParaRPr lang="en-US" dirty="0"/>
           </a:p>
@@ -4325,7 +4326,177 @@
           <a:bodyPr/>
           <a:lstStyle/>
           <a:p>
-            <a:endParaRPr lang="en-US" dirty="0"/>
+            <a:pPr marL="0" marR="0" lvl="0" indent="0" algn="l" defTabSz="914400" rtl="0" eaLnBrk="1" fontAlgn="auto" latinLnBrk="0" hangingPunct="1">
+              <a:lnSpc>
+                <a:spcPct val="100000"/>
+              </a:lnSpc>
+              <a:spcBef>
+                <a:spcPts val="0"/>
+              </a:spcBef>
+              <a:spcAft>
+                <a:spcPts val="0"/>
+              </a:spcAft>
+              <a:buClrTx/>
+              <a:buSzTx/>
+              <a:buFontTx/>
+              <a:buNone/>
+              <a:tabLst/>
+              <a:defRPr/>
+            </a:pPr>
+            <a:r>
+              <a:rPr lang="en-US" sz="1200" b="1" dirty="0">
+                <a:solidFill>
+                  <a:schemeClr val="tx1"/>
+                </a:solidFill>
+                <a:latin typeface="Segoe UI Light" panose="020B0502040204020203" pitchFamily="34" charset="0"/>
+                <a:ea typeface="Segoe UI" panose="020B0502040204020203" pitchFamily="34" charset="0"/>
+                <a:cs typeface="Segoe UI Light" panose="020B0502040204020203" pitchFamily="34" charset="0"/>
+              </a:rPr>
+              <a:t>How do we optimize our indexes for both write-heavy and read-heavy workloads?</a:t>
+            </a:r>
+            <a:endParaRPr lang="en-US" sz="1200" b="1" i="0" kern="1200" dirty="0">
+              <a:solidFill>
+                <a:schemeClr val="tx1"/>
+              </a:solidFill>
+              <a:effectLst/>
+              <a:latin typeface="+mn-lt"/>
+              <a:ea typeface="+mn-ea"/>
+              <a:cs typeface="+mn-cs"/>
+            </a:endParaRPr>
+          </a:p>
+          <a:p>
+            <a:endParaRPr lang="en-US" sz="1200" b="0" i="0" kern="1200" dirty="0">
+              <a:solidFill>
+                <a:schemeClr val="tx1"/>
+              </a:solidFill>
+              <a:effectLst/>
+              <a:latin typeface="+mn-lt"/>
+              <a:ea typeface="+mn-ea"/>
+              <a:cs typeface="+mn-cs"/>
+            </a:endParaRPr>
+          </a:p>
+          <a:p>
+            <a:r>
+              <a:rPr lang="en-US" sz="1200" b="0" i="0" kern="1200" dirty="0">
+                <a:solidFill>
+                  <a:schemeClr val="tx1"/>
+                </a:solidFill>
+                <a:effectLst/>
+                <a:latin typeface="+mn-lt"/>
+                <a:ea typeface="+mn-ea"/>
+                <a:cs typeface="+mn-cs"/>
+              </a:rPr>
+              <a:t>Woodgrove Bank should create two or more Cosmos DB containers for their scenario, based on different indexing requirements and access patterns. Let us call the container in which streaming data is ingested, telemetry. This container will likely have a higher throughput than the other containers, and its index should also be optimized for write-heavy workloads. To do this, Woodgrove should not use the default index for the 'telemetry' container, but only include paths that they know will be queried further down the processing pipeline. The other containers, which tend to have a more read-heavy workload, can benefit from the default indexing policy.</a:t>
+            </a:r>
+          </a:p>
+          <a:p>
+            <a:endParaRPr lang="en-US" sz="1200" b="0" i="0" kern="1200" dirty="0">
+              <a:solidFill>
+                <a:schemeClr val="tx1"/>
+              </a:solidFill>
+              <a:effectLst/>
+              <a:latin typeface="+mn-lt"/>
+              <a:ea typeface="+mn-ea"/>
+              <a:cs typeface="+mn-cs"/>
+            </a:endParaRPr>
+          </a:p>
+          <a:p>
+            <a:endParaRPr lang="en-US" sz="1200" b="0" i="0" kern="1200" dirty="0">
+              <a:solidFill>
+                <a:schemeClr val="tx1"/>
+              </a:solidFill>
+              <a:effectLst/>
+              <a:latin typeface="+mn-lt"/>
+              <a:ea typeface="+mn-ea"/>
+              <a:cs typeface="+mn-cs"/>
+            </a:endParaRPr>
+          </a:p>
+          <a:p>
+            <a:r>
+              <a:rPr lang="en-US" sz="1200" b="0" i="0" kern="1200" dirty="0">
+                <a:solidFill>
+                  <a:schemeClr val="tx1"/>
+                </a:solidFill>
+                <a:effectLst/>
+                <a:latin typeface="+mn-lt"/>
+                <a:ea typeface="+mn-ea"/>
+                <a:cs typeface="+mn-cs"/>
+              </a:rPr>
+              <a:t>The default indexing policy for newly created containers indexes every property of every item, enforcing range indexes for any string or number, and spatial indexes for any </a:t>
+            </a:r>
+            <a:r>
+              <a:rPr lang="en-US" sz="1200" b="0" i="0" kern="1200" dirty="0" err="1">
+                <a:solidFill>
+                  <a:schemeClr val="tx1"/>
+                </a:solidFill>
+                <a:effectLst/>
+                <a:latin typeface="+mn-lt"/>
+                <a:ea typeface="+mn-ea"/>
+                <a:cs typeface="+mn-cs"/>
+              </a:rPr>
+              <a:t>GeoJSON</a:t>
+            </a:r>
+            <a:r>
+              <a:rPr lang="en-US" sz="1200" b="0" i="0" kern="1200" dirty="0">
+                <a:solidFill>
+                  <a:schemeClr val="tx1"/>
+                </a:solidFill>
+                <a:effectLst/>
+                <a:latin typeface="+mn-lt"/>
+                <a:ea typeface="+mn-ea"/>
+                <a:cs typeface="+mn-cs"/>
+              </a:rPr>
+              <a:t> object of type Point. This allows you to get high query performance without having to think about indexing and index management upfront. Since we need faster writes for telemetry, we exclude unused paths. The use of indexing paths can offer improved write performance and lower index storage for scenarios in which the query patterns are known beforehand, as indexing costs are directly correlated to the number of unique paths indexed.</a:t>
+            </a:r>
+          </a:p>
+          <a:p>
+            <a:endParaRPr lang="en-US" sz="1200" b="0" i="0" kern="1200" dirty="0">
+              <a:solidFill>
+                <a:schemeClr val="tx1"/>
+              </a:solidFill>
+              <a:effectLst/>
+              <a:latin typeface="+mn-lt"/>
+              <a:ea typeface="+mn-ea"/>
+              <a:cs typeface="+mn-cs"/>
+            </a:endParaRPr>
+          </a:p>
+          <a:p>
+            <a:r>
+              <a:rPr lang="en-US" sz="1200" b="0" i="0" kern="1200" dirty="0">
+                <a:solidFill>
+                  <a:schemeClr val="tx1"/>
+                </a:solidFill>
+                <a:effectLst/>
+                <a:latin typeface="+mn-lt"/>
+                <a:ea typeface="+mn-ea"/>
+                <a:cs typeface="+mn-cs"/>
+              </a:rPr>
+              <a:t>The indexing mode for all the Cosmos DB containers should be set to </a:t>
+            </a:r>
+            <a:r>
+              <a:rPr lang="en-US" sz="1200" b="1" i="0" kern="1200" dirty="0">
+                <a:solidFill>
+                  <a:schemeClr val="tx1"/>
+                </a:solidFill>
+                <a:effectLst/>
+                <a:latin typeface="+mn-lt"/>
+                <a:ea typeface="+mn-ea"/>
+                <a:cs typeface="+mn-cs"/>
+              </a:rPr>
+              <a:t>Consistent</a:t>
+            </a:r>
+            <a:r>
+              <a:rPr lang="en-US" sz="1200" b="0" i="0" kern="1200" dirty="0">
+                <a:solidFill>
+                  <a:schemeClr val="tx1"/>
+                </a:solidFill>
+                <a:effectLst/>
+                <a:latin typeface="+mn-lt"/>
+                <a:ea typeface="+mn-ea"/>
+                <a:cs typeface="+mn-cs"/>
+              </a:rPr>
+              <a:t>. This means the index is updated synchronously as items are added, updated, or deleted, enforcing the consistency level configured for the account for read queries. The other indexing mode one could choose is None, which disables indexing on the container. Usually this mode is used when your container acts as a pure key-value store, and you do not need indexes for any of the other properties. It is possible to dynamically change the consistency mode prior to executing bulk operations, then changing the mode back to Consistent afterwards, if the potential performance increase warrants the temporary change.</a:t>
+            </a:r>
           </a:p>
         </p:txBody>
       </p:sp>
@@ -4355,6 +4526,90 @@
     </p:spTree>
     <p:extLst>
       <p:ext uri="{BB962C8B-B14F-4D97-AF65-F5344CB8AC3E}">
+        <p14:creationId xmlns:p14="http://schemas.microsoft.com/office/powerpoint/2010/main" val="3110395522"/>
+      </p:ext>
+    </p:extLst>
+  </p:cSld>
+  <p:clrMapOvr>
+    <a:masterClrMapping/>
+  </p:clrMapOvr>
+</p:notes>
+</file>
+
+<file path=ppt/notesSlides/notesSlide32.xml><?xml version="1.0" encoding="utf-8"?>
+<p:notes xmlns:a="http://schemas.openxmlformats.org/drawingml/2006/main" xmlns:r="http://schemas.openxmlformats.org/officeDocument/2006/relationships" xmlns:p="http://schemas.openxmlformats.org/presentationml/2006/main">
+  <p:cSld>
+    <p:spTree>
+      <p:nvGrpSpPr>
+        <p:cNvPr id="1" name=""/>
+        <p:cNvGrpSpPr/>
+        <p:nvPr/>
+      </p:nvGrpSpPr>
+      <p:grpSpPr>
+        <a:xfrm>
+          <a:off x="0" y="0"/>
+          <a:ext cx="0" cy="0"/>
+          <a:chOff x="0" y="0"/>
+          <a:chExt cx="0" cy="0"/>
+        </a:xfrm>
+      </p:grpSpPr>
+      <p:sp>
+        <p:nvSpPr>
+          <p:cNvPr id="2" name="Slide Image Placeholder 1"/>
+          <p:cNvSpPr>
+            <a:spLocks noGrp="1" noRot="1" noChangeAspect="1"/>
+          </p:cNvSpPr>
+          <p:nvPr>
+            <p:ph type="sldImg"/>
+          </p:nvPr>
+        </p:nvSpPr>
+        <p:spPr/>
+      </p:sp>
+      <p:sp>
+        <p:nvSpPr>
+          <p:cNvPr id="3" name="Notes Placeholder 2"/>
+          <p:cNvSpPr>
+            <a:spLocks noGrp="1"/>
+          </p:cNvSpPr>
+          <p:nvPr>
+            <p:ph type="body" idx="1"/>
+          </p:nvPr>
+        </p:nvSpPr>
+        <p:spPr/>
+        <p:txBody>
+          <a:bodyPr/>
+          <a:lstStyle/>
+          <a:p>
+            <a:endParaRPr lang="en-US" dirty="0"/>
+          </a:p>
+        </p:txBody>
+      </p:sp>
+      <p:sp>
+        <p:nvSpPr>
+          <p:cNvPr id="4" name="Slide Number Placeholder 3"/>
+          <p:cNvSpPr>
+            <a:spLocks noGrp="1"/>
+          </p:cNvSpPr>
+          <p:nvPr>
+            <p:ph type="sldNum" sz="quarter" idx="10"/>
+          </p:nvPr>
+        </p:nvSpPr>
+        <p:spPr/>
+        <p:txBody>
+          <a:bodyPr/>
+          <a:lstStyle/>
+          <a:p>
+            <a:fld id="{0998D5BB-B127-481F-BC0A-2F77C576BB34}" type="slidenum">
+              <a:rPr lang="en-US" smtClean="0"/>
+              <a:t>32</a:t>
+            </a:fld>
+            <a:endParaRPr lang="en-US" dirty="0"/>
+          </a:p>
+        </p:txBody>
+      </p:sp>
+    </p:spTree>
+    <p:extLst>
+      <p:ext uri="{BB962C8B-B14F-4D97-AF65-F5344CB8AC3E}">
         <p14:creationId xmlns:p14="http://schemas.microsoft.com/office/powerpoint/2010/main" val="671285550"/>
       </p:ext>
     </p:extLst>
@@ -4365,7 +4620,7 @@
 </p:notes>
 </file>
 
-<file path=ppt/notesSlides/notesSlide32.xml><?xml version="1.0" encoding="utf-8"?>
+<file path=ppt/notesSlides/notesSlide33.xml><?xml version="1.0" encoding="utf-8"?>
 <p:notes xmlns:a="http://schemas.openxmlformats.org/drawingml/2006/main" xmlns:r="http://schemas.openxmlformats.org/officeDocument/2006/relationships" xmlns:p="http://schemas.openxmlformats.org/presentationml/2006/main">
   <p:cSld>
     <p:spTree>
@@ -4472,7 +4727,7 @@
                   <a:prstClr val="black"/>
                 </a:solidFill>
               </a:rPr>
-              <a:t>5/21/2019 5:35 PM</a:t>
+              <a:t>11/5/2019 5:19 PM</a:t>
             </a:fld>
             <a:endParaRPr lang="en-US" dirty="0">
               <a:solidFill>
@@ -4504,7 +4759,7 @@
                 </a:solidFill>
               </a:rPr>
               <a:pPr/>
-              <a:t>32</a:t>
+              <a:t>33</a:t>
             </a:fld>
             <a:endParaRPr lang="en-US" dirty="0">
               <a:solidFill>
@@ -5276,6 +5531,10 @@
           <a:bodyPr/>
           <a:lstStyle/>
           <a:p>
+            <a:pPr marL="171450" indent="-171450">
+              <a:buFont typeface="Arial" panose="020B0604020202020204" pitchFamily="34" charset="0"/>
+              <a:buChar char="•"/>
+            </a:pPr>
             <a:r>
               <a:rPr lang="en-US" sz="1200" b="0" kern="1200" dirty="0">
                 <a:solidFill>
@@ -5288,6 +5547,48 @@
               </a:rPr>
               <a:t>We are concerned about how much it costs to use Cosmos DB for our solution. What is the real value of the service, and how do we set up Cosmos DB in an optimal way?</a:t>
             </a:r>
+          </a:p>
+          <a:p>
+            <a:pPr marL="171450" marR="0" lvl="0" indent="-171450" algn="l" defTabSz="914400" rtl="0" eaLnBrk="1" fontAlgn="auto" latinLnBrk="0" hangingPunct="1">
+              <a:lnSpc>
+                <a:spcPct val="100000"/>
+              </a:lnSpc>
+              <a:spcBef>
+                <a:spcPts val="0"/>
+              </a:spcBef>
+              <a:spcAft>
+                <a:spcPts val="0"/>
+              </a:spcAft>
+              <a:buClrTx/>
+              <a:buSzTx/>
+              <a:buFont typeface="Arial" panose="020B0604020202020204" pitchFamily="34" charset="0"/>
+              <a:buChar char="•"/>
+              <a:tabLst/>
+              <a:defRPr/>
+            </a:pPr>
+            <a:r>
+              <a:rPr lang="en-US" sz="1200" b="0" kern="1200" dirty="0">
+                <a:solidFill>
+                  <a:schemeClr val="tx1"/>
+                </a:solidFill>
+                <a:effectLst/>
+                <a:latin typeface="+mn-lt"/>
+                <a:ea typeface="+mn-ea"/>
+                <a:cs typeface="+mn-cs"/>
+              </a:rPr>
+              <a:t>How do we optimize our indexes for both write-heavy and read-heavy workloads?</a:t>
+            </a:r>
+          </a:p>
+          <a:p>
+            <a:endParaRPr lang="en-US" sz="1200" b="0" kern="1200" dirty="0">
+              <a:solidFill>
+                <a:schemeClr val="tx1"/>
+              </a:solidFill>
+              <a:effectLst/>
+              <a:latin typeface="+mn-lt"/>
+              <a:ea typeface="+mn-ea"/>
+              <a:cs typeface="+mn-cs"/>
+            </a:endParaRPr>
           </a:p>
         </p:txBody>
       </p:sp>
@@ -5582,7 +5883,7 @@
       </p:transition>
     </mc:Fallback>
   </mc:AlternateContent>
-  <p:extLst mod="1">
+  <p:extLst>
     <p:ext uri="{DCECCB84-F9BA-43D5-87BE-67443E8EF086}">
       <p15:sldGuideLst xmlns:p15="http://schemas.microsoft.com/office/powerpoint/2012/main">
         <p15:guide id="1" pos="288">
@@ -16587,7 +16888,7 @@
       </a:lvl9pPr>
     </p:otherStyle>
   </p:txStyles>
-  <p:extLst mod="1">
+  <p:extLst>
     <p:ext uri="{27BBF7A9-308A-43DC-89C8-2F10F3537804}">
       <p15:sldGuideLst xmlns:p15="http://schemas.microsoft.com/office/powerpoint/2012/main">
         <p15:guide id="1" orient="horz" pos="187">
@@ -17202,7 +17503,7 @@
       </a:lvl9pPr>
     </p:otherStyle>
   </p:txStyles>
-  <p:extLst mod="1">
+  <p:extLst>
     <p:ext uri="{27BBF7A9-308A-43DC-89C8-2F10F3537804}">
       <p15:sldGuideLst xmlns:p15="http://schemas.microsoft.com/office/powerpoint/2012/main">
         <p15:guide id="1" orient="horz" pos="187">
@@ -23564,6 +23865,303 @@
                 </a:solidFill>
                 <a:cs typeface="Segoe UI" panose="020B0502040204020203" pitchFamily="34" charset="0"/>
               </a:rPr>
+              <a:t>Preferred objections handling</a:t>
+            </a:r>
+            <a:br>
+              <a:rPr lang="en-US" dirty="0">
+                <a:solidFill>
+                  <a:schemeClr val="tx1"/>
+                </a:solidFill>
+                <a:latin typeface="Segoe UI" panose="020B0502040204020203" pitchFamily="34" charset="0"/>
+              </a:rPr>
+            </a:br>
+            <a:endParaRPr lang="en-US" sz="3236" dirty="0">
+              <a:solidFill>
+                <a:schemeClr val="tx1"/>
+              </a:solidFill>
+              <a:latin typeface="Segoe UI" panose="020B0502040204020203" pitchFamily="34" charset="0"/>
+            </a:endParaRPr>
+          </a:p>
+        </p:txBody>
+      </p:sp>
+      <p:sp>
+        <p:nvSpPr>
+          <p:cNvPr id="6" name="Content Placeholder 2">
+            <a:extLst>
+              <a:ext uri="{FF2B5EF4-FFF2-40B4-BE49-F238E27FC236}">
+                <a16:creationId xmlns:a16="http://schemas.microsoft.com/office/drawing/2014/main" id="{5FE77A15-50F1-4647-9C43-F377F1C592EE}"/>
+              </a:ext>
+            </a:extLst>
+          </p:cNvPr>
+          <p:cNvSpPr>
+            <a:spLocks noGrp="1"/>
+          </p:cNvSpPr>
+          <p:nvPr>
+            <p:ph type="body" sz="quarter" idx="10"/>
+          </p:nvPr>
+        </p:nvSpPr>
+        <p:spPr>
+          <a:xfrm>
+            <a:off x="269241" y="1189176"/>
+            <a:ext cx="11435848" cy="5618680"/>
+          </a:xfrm>
+        </p:spPr>
+        <p:txBody>
+          <a:bodyPr>
+            <a:normAutofit/>
+          </a:bodyPr>
+          <a:lstStyle/>
+          <a:p>
+            <a:r>
+              <a:rPr lang="en-US" sz="3200" dirty="0">
+                <a:solidFill>
+                  <a:schemeClr val="tx1"/>
+                </a:solidFill>
+                <a:latin typeface="Segoe UI Light" panose="020B0502040204020203" pitchFamily="34" charset="0"/>
+                <a:ea typeface="Segoe UI" panose="020B0502040204020203" pitchFamily="34" charset="0"/>
+                <a:cs typeface="Segoe UI Light" panose="020B0502040204020203" pitchFamily="34" charset="0"/>
+              </a:rPr>
+              <a:t>How do we optimize our indexes for </a:t>
+            </a:r>
+            <a:r>
+              <a:rPr lang="en-US" sz="3200">
+                <a:solidFill>
+                  <a:schemeClr val="tx1"/>
+                </a:solidFill>
+                <a:latin typeface="Segoe UI Light" panose="020B0502040204020203" pitchFamily="34" charset="0"/>
+                <a:ea typeface="Segoe UI" panose="020B0502040204020203" pitchFamily="34" charset="0"/>
+                <a:cs typeface="Segoe UI Light" panose="020B0502040204020203" pitchFamily="34" charset="0"/>
+              </a:rPr>
+              <a:t>both write-heavy</a:t>
+            </a:r>
+            <a:br>
+              <a:rPr lang="en-US" sz="3200">
+                <a:solidFill>
+                  <a:schemeClr val="tx1"/>
+                </a:solidFill>
+                <a:latin typeface="Segoe UI Light" panose="020B0502040204020203" pitchFamily="34" charset="0"/>
+                <a:ea typeface="Segoe UI" panose="020B0502040204020203" pitchFamily="34" charset="0"/>
+                <a:cs typeface="Segoe UI Light" panose="020B0502040204020203" pitchFamily="34" charset="0"/>
+              </a:rPr>
+            </a:br>
+            <a:r>
+              <a:rPr lang="en-US" sz="3200">
+                <a:solidFill>
+                  <a:schemeClr val="tx1"/>
+                </a:solidFill>
+                <a:latin typeface="Segoe UI Light" panose="020B0502040204020203" pitchFamily="34" charset="0"/>
+                <a:ea typeface="Segoe UI" panose="020B0502040204020203" pitchFamily="34" charset="0"/>
+                <a:cs typeface="Segoe UI Light" panose="020B0502040204020203" pitchFamily="34" charset="0"/>
+              </a:rPr>
+              <a:t>and </a:t>
+            </a:r>
+            <a:r>
+              <a:rPr lang="en-US" sz="3200" dirty="0">
+                <a:solidFill>
+                  <a:schemeClr val="tx1"/>
+                </a:solidFill>
+                <a:latin typeface="Segoe UI Light" panose="020B0502040204020203" pitchFamily="34" charset="0"/>
+                <a:ea typeface="Segoe UI" panose="020B0502040204020203" pitchFamily="34" charset="0"/>
+                <a:cs typeface="Segoe UI Light" panose="020B0502040204020203" pitchFamily="34" charset="0"/>
+              </a:rPr>
+              <a:t>read-heavy workloads?</a:t>
+            </a:r>
+          </a:p>
+          <a:p>
+            <a:endParaRPr lang="en-US" sz="3200" dirty="0">
+              <a:solidFill>
+                <a:schemeClr val="tx1"/>
+              </a:solidFill>
+              <a:latin typeface="Segoe UI Light" panose="020B0502040204020203" pitchFamily="34" charset="0"/>
+              <a:ea typeface="Segoe UI" panose="020B0502040204020203" pitchFamily="34" charset="0"/>
+              <a:cs typeface="Segoe UI Light" panose="020B0502040204020203" pitchFamily="34" charset="0"/>
+            </a:endParaRPr>
+          </a:p>
+          <a:p>
+            <a:pPr marL="336145" lvl="1" indent="0">
+              <a:buNone/>
+            </a:pPr>
+            <a:r>
+              <a:rPr lang="en-US" sz="2800" dirty="0">
+                <a:solidFill>
+                  <a:schemeClr val="tx1"/>
+                </a:solidFill>
+                <a:latin typeface="Segoe UI Light" panose="020B0502040204020203" pitchFamily="34" charset="0"/>
+                <a:ea typeface="Segoe UI" panose="020B0502040204020203" pitchFamily="34" charset="0"/>
+                <a:cs typeface="Segoe UI Light" panose="020B0502040204020203" pitchFamily="34" charset="0"/>
+              </a:rPr>
+              <a:t>Woodgrove should create two or more containers based on different access patterns. The streaming data in ingested into a container named “telemetry”, which has higher throughput and </a:t>
+            </a:r>
+            <a:r>
+              <a:rPr lang="en-US" sz="2800" b="1" dirty="0">
+                <a:solidFill>
+                  <a:schemeClr val="tx1"/>
+                </a:solidFill>
+                <a:latin typeface="Segoe UI Light" panose="020B0502040204020203" pitchFamily="34" charset="0"/>
+                <a:ea typeface="Segoe UI" panose="020B0502040204020203" pitchFamily="34" charset="0"/>
+                <a:cs typeface="Segoe UI Light" panose="020B0502040204020203" pitchFamily="34" charset="0"/>
+              </a:rPr>
+              <a:t>does not </a:t>
+            </a:r>
+            <a:r>
+              <a:rPr lang="en-US" sz="2800" dirty="0">
+                <a:solidFill>
+                  <a:schemeClr val="tx1"/>
+                </a:solidFill>
+                <a:latin typeface="Segoe UI Light" panose="020B0502040204020203" pitchFamily="34" charset="0"/>
+                <a:ea typeface="Segoe UI" panose="020B0502040204020203" pitchFamily="34" charset="0"/>
+                <a:cs typeface="Segoe UI Light" panose="020B0502040204020203" pitchFamily="34" charset="0"/>
+              </a:rPr>
+              <a:t>use the default indexing policy. The index should be optimized for write-heavy workloads by only including paths that they know will be queried further down the processing pipeline. The other container(s) should use the default indexing policy for read-heavy workloads.</a:t>
+            </a:r>
+            <a:br>
+              <a:rPr lang="en-US" sz="2800" dirty="0">
+                <a:solidFill>
+                  <a:schemeClr val="tx1"/>
+                </a:solidFill>
+                <a:latin typeface="Segoe UI Light" panose="020B0502040204020203" pitchFamily="34" charset="0"/>
+                <a:ea typeface="Segoe UI" panose="020B0502040204020203" pitchFamily="34" charset="0"/>
+                <a:cs typeface="Segoe UI Light" panose="020B0502040204020203" pitchFamily="34" charset="0"/>
+              </a:rPr>
+            </a:br>
+            <a:br>
+              <a:rPr lang="en-US" sz="2000" dirty="0">
+                <a:solidFill>
+                  <a:schemeClr val="tx1"/>
+                </a:solidFill>
+                <a:latin typeface="Segoe UI Light" panose="020B0502040204020203" pitchFamily="34" charset="0"/>
+                <a:ea typeface="Segoe UI" panose="020B0502040204020203" pitchFamily="34" charset="0"/>
+                <a:cs typeface="Segoe UI Light" panose="020B0502040204020203" pitchFamily="34" charset="0"/>
+              </a:rPr>
+            </a:br>
+            <a:r>
+              <a:rPr lang="en-US" sz="2000" dirty="0">
+                <a:solidFill>
+                  <a:schemeClr val="tx1"/>
+                </a:solidFill>
+              </a:rPr>
+              <a:t>The indexing mode for all the Cosmos DB containers should be set to </a:t>
+            </a:r>
+            <a:r>
+              <a:rPr lang="en-US" sz="2000" b="1" dirty="0">
+                <a:solidFill>
+                  <a:schemeClr val="tx1"/>
+                </a:solidFill>
+              </a:rPr>
+              <a:t>Consistent</a:t>
+            </a:r>
+            <a:r>
+              <a:rPr lang="en-US" sz="2000" dirty="0">
+                <a:solidFill>
+                  <a:schemeClr val="tx1"/>
+                </a:solidFill>
+              </a:rPr>
+              <a:t>. This means the index is updated synchronously as items are added, updated, or deleted, enforcing the consistency level configured for the account for read queries.</a:t>
+            </a:r>
+          </a:p>
+        </p:txBody>
+      </p:sp>
+      <p:pic>
+        <p:nvPicPr>
+          <p:cNvPr id="7" name="Graphic 6" descr="Question icon&#10;&#10;">
+            <a:extLst>
+              <a:ext uri="{FF2B5EF4-FFF2-40B4-BE49-F238E27FC236}">
+                <a16:creationId xmlns:a16="http://schemas.microsoft.com/office/drawing/2014/main" id="{889D6449-11C1-40AE-9B51-5752FA2A011F}"/>
+              </a:ext>
+            </a:extLst>
+          </p:cNvPr>
+          <p:cNvPicPr>
+            <a:picLocks noChangeAspect="1"/>
+          </p:cNvPicPr>
+          <p:nvPr/>
+        </p:nvPicPr>
+        <p:blipFill>
+          <a:blip r:embed="rId3">
+            <a:extLst>
+              <a:ext uri="{28A0092B-C50C-407E-A947-70E740481C1C}">
+                <a14:useLocalDpi xmlns:a14="http://schemas.microsoft.com/office/drawing/2010/main" val="0"/>
+              </a:ext>
+              <a:ext uri="{96DAC541-7B7A-43D3-8B79-37D633B846F1}">
+                <asvg:svgBlip xmlns:asvg="http://schemas.microsoft.com/office/drawing/2016/SVG/main" r:embed="rId4"/>
+              </a:ext>
+            </a:extLst>
+          </a:blip>
+          <a:stretch>
+            <a:fillRect/>
+          </a:stretch>
+        </p:blipFill>
+        <p:spPr>
+          <a:xfrm>
+            <a:off x="9753008" y="104300"/>
+            <a:ext cx="2169751" cy="2169751"/>
+          </a:xfrm>
+          <a:prstGeom prst="rect">
+            <a:avLst/>
+          </a:prstGeom>
+        </p:spPr>
+      </p:pic>
+    </p:spTree>
+    <p:extLst>
+      <p:ext uri="{BB962C8B-B14F-4D97-AF65-F5344CB8AC3E}">
+        <p14:creationId xmlns:p14="http://schemas.microsoft.com/office/powerpoint/2010/main" val="3200318401"/>
+      </p:ext>
+    </p:extLst>
+  </p:cSld>
+  <p:clrMapOvr>
+    <a:masterClrMapping/>
+  </p:clrMapOvr>
+  <mc:AlternateContent xmlns:mc="http://schemas.openxmlformats.org/markup-compatibility/2006" xmlns:p14="http://schemas.microsoft.com/office/powerpoint/2010/main">
+    <mc:Choice Requires="p14">
+      <p:transition p14:dur="0"/>
+    </mc:Choice>
+    <mc:Fallback xmlns="">
+      <p:transition/>
+    </mc:Fallback>
+  </mc:AlternateContent>
+</p:sld>
+</file>
+
+<file path=ppt/slides/slide32.xml><?xml version="1.0" encoding="utf-8"?>
+<p:sld xmlns:a="http://schemas.openxmlformats.org/drawingml/2006/main" xmlns:r="http://schemas.openxmlformats.org/officeDocument/2006/relationships" xmlns:p="http://schemas.openxmlformats.org/presentationml/2006/main">
+  <p:cSld>
+    <p:spTree>
+      <p:nvGrpSpPr>
+        <p:cNvPr id="1" name=""/>
+        <p:cNvGrpSpPr/>
+        <p:nvPr/>
+      </p:nvGrpSpPr>
+      <p:grpSpPr>
+        <a:xfrm>
+          <a:off x="0" y="0"/>
+          <a:ext cx="0" cy="0"/>
+          <a:chOff x="0" y="0"/>
+          <a:chExt cx="0" cy="0"/>
+        </a:xfrm>
+      </p:grpSpPr>
+      <p:sp>
+        <p:nvSpPr>
+          <p:cNvPr id="2" name="Title 1"/>
+          <p:cNvSpPr>
+            <a:spLocks noGrp="1"/>
+          </p:cNvSpPr>
+          <p:nvPr>
+            <p:ph type="title"/>
+          </p:nvPr>
+        </p:nvSpPr>
+        <p:spPr/>
+        <p:txBody>
+          <a:bodyPr>
+            <a:normAutofit fontScale="90000"/>
+          </a:bodyPr>
+          <a:lstStyle/>
+          <a:p>
+            <a:r>
+              <a:rPr lang="en-US" sz="4900" dirty="0">
+                <a:solidFill>
+                  <a:schemeClr val="tx1"/>
+                </a:solidFill>
+                <a:cs typeface="Segoe UI" panose="020B0502040204020203" pitchFamily="34" charset="0"/>
+              </a:rPr>
               <a:t>Customer quote</a:t>
             </a:r>
             <a:br>
@@ -23701,7 +24299,7 @@
 </p:sld>
 </file>
 
-<file path=ppt/slides/slide32.xml><?xml version="1.0" encoding="utf-8"?>
+<file path=ppt/slides/slide33.xml><?xml version="1.0" encoding="utf-8"?>
 <p:sld xmlns:a="http://schemas.openxmlformats.org/drawingml/2006/main" xmlns:r="http://schemas.openxmlformats.org/officeDocument/2006/relationships" xmlns:p="http://schemas.openxmlformats.org/presentationml/2006/main">
   <p:cSld>
     <p:bg>
@@ -25511,6 +26109,19 @@
                 <a:cs typeface="Segoe UI Semilight" panose="020B0402040204020203" pitchFamily="34" charset="0"/>
               </a:rPr>
               <a:t>We are concerned about how much it costs to use Cosmos DB for our solution. What is the real value of the service, and how do we set up Cosmos DB in an optimal way?</a:t>
+            </a:r>
+          </a:p>
+          <a:p>
+            <a:pPr lvl="1"/>
+            <a:r>
+              <a:rPr lang="en-US" sz="3600" dirty="0">
+                <a:solidFill>
+                  <a:schemeClr val="tx1"/>
+                </a:solidFill>
+                <a:latin typeface="Segoe UI Semilight" panose="020B0402040204020203" pitchFamily="34" charset="0"/>
+                <a:cs typeface="Segoe UI Semilight" panose="020B0402040204020203" pitchFamily="34" charset="0"/>
+              </a:rPr>
+              <a:t>How do we optimize our indexes for both write-heavy and read-heavy workloads?</a:t>
             </a:r>
           </a:p>
           <a:p>

</xml_diff>